<commit_message>
Deploy website Tue Oct 18 12:43:49 PDT 2022
</commit_message>
<xml_diff>
--- a/assets/slides/fa22/16-Midterm_Review.pptx
+++ b/assets/slides/fa22/16-Midterm_Review.pptx
@@ -5,40 +5,42 @@
     <p:sldMasterId id="2147483659" r:id="rId1"/>
   </p:sldMasterIdLst>
   <p:notesMasterIdLst>
-    <p:notesMasterId r:id="rId13"/>
+    <p:notesMasterId r:id="rId15"/>
   </p:notesMasterIdLst>
   <p:sldIdLst>
     <p:sldId id="256" r:id="rId2"/>
     <p:sldId id="257" r:id="rId3"/>
     <p:sldId id="260" r:id="rId4"/>
-    <p:sldId id="261" r:id="rId5"/>
-    <p:sldId id="265" r:id="rId6"/>
-    <p:sldId id="262" r:id="rId7"/>
-    <p:sldId id="266" r:id="rId8"/>
-    <p:sldId id="263" r:id="rId9"/>
-    <p:sldId id="267" r:id="rId10"/>
-    <p:sldId id="264" r:id="rId11"/>
-    <p:sldId id="268" r:id="rId12"/>
+    <p:sldId id="269" r:id="rId5"/>
+    <p:sldId id="270" r:id="rId6"/>
+    <p:sldId id="261" r:id="rId7"/>
+    <p:sldId id="265" r:id="rId8"/>
+    <p:sldId id="262" r:id="rId9"/>
+    <p:sldId id="266" r:id="rId10"/>
+    <p:sldId id="263" r:id="rId11"/>
+    <p:sldId id="267" r:id="rId12"/>
+    <p:sldId id="264" r:id="rId13"/>
+    <p:sldId id="268" r:id="rId14"/>
   </p:sldIdLst>
   <p:sldSz cx="12192000" cy="6858000"/>
   <p:notesSz cx="6997700" cy="9194800"/>
   <p:embeddedFontLst>
     <p:embeddedFont>
       <p:font typeface="FreightSans Pro Medium" panose="02000606030000020004" pitchFamily="2" charset="0"/>
-      <p:regular r:id="rId14"/>
-      <p:italic r:id="rId15"/>
+      <p:regular r:id="rId16"/>
+      <p:italic r:id="rId17"/>
     </p:embeddedFont>
     <p:embeddedFont>
       <p:font typeface="FreightSans Pro Semibold" panose="02000606030000020004" pitchFamily="2" charset="0"/>
-      <p:regular r:id="rId16"/>
-      <p:bold r:id="rId17"/>
-      <p:italic r:id="rId18"/>
-      <p:boldItalic r:id="rId19"/>
+      <p:regular r:id="rId18"/>
+      <p:bold r:id="rId19"/>
+      <p:italic r:id="rId20"/>
+      <p:boldItalic r:id="rId21"/>
     </p:embeddedFont>
     <p:embeddedFont>
       <p:font typeface="FreightText Pro Book" panose="02000603060000020004" pitchFamily="2" charset="0"/>
-      <p:regular r:id="rId20"/>
-      <p:italic r:id="rId21"/>
+      <p:regular r:id="rId22"/>
+      <p:italic r:id="rId23"/>
     </p:embeddedFont>
   </p:embeddedFontLst>
   <p:defaultTextStyle>
@@ -1620,7 +1622,7 @@
           </a:ln>
           <a:extLst>
             <a:ext uri="{909E8E84-426E-40dd-AFC4-6F175D3DCCD1}">
-              <a14:hiddenFill xmlns="" xmlns:a14="http://schemas.microsoft.com/office/drawing/2010/main">
+              <a14:hiddenFill xmlns:a14="http://schemas.microsoft.com/office/drawing/2010/main" xmlns="">
                 <a:noFill/>
               </a14:hiddenFill>
             </a:ext>
@@ -1661,14 +1663,14 @@
           </a:ln>
           <a:extLst>
             <a:ext uri="{909E8E84-426E-40dd-AFC4-6F175D3DCCD1}">
-              <a14:hiddenFill xmlns="" xmlns:a14="http://schemas.microsoft.com/office/drawing/2010/main">
+              <a14:hiddenFill xmlns:a14="http://schemas.microsoft.com/office/drawing/2010/main" xmlns="">
                 <a:solidFill>
                   <a:srgbClr val="FFFFFF"/>
                 </a:solidFill>
               </a14:hiddenFill>
             </a:ext>
             <a:ext uri="{91240B29-F687-4f45-9708-019B960494DF}">
-              <a14:hiddenLine xmlns="" xmlns:a14="http://schemas.microsoft.com/office/drawing/2010/main" w="9525">
+              <a14:hiddenLine xmlns:a14="http://schemas.microsoft.com/office/drawing/2010/main" xmlns="" w="9525">
                 <a:solidFill>
                   <a:srgbClr val="000000"/>
                 </a:solidFill>
@@ -1774,14 +1776,14 @@
           </a:ln>
           <a:extLst>
             <a:ext uri="{909E8E84-426E-40dd-AFC4-6F175D3DCCD1}">
-              <a14:hiddenFill xmlns="" xmlns:a14="http://schemas.microsoft.com/office/drawing/2010/main">
+              <a14:hiddenFill xmlns:a14="http://schemas.microsoft.com/office/drawing/2010/main" xmlns="">
                 <a:solidFill>
                   <a:srgbClr val="FFFFFF"/>
                 </a:solidFill>
               </a14:hiddenFill>
             </a:ext>
             <a:ext uri="{91240B29-F687-4f45-9708-019B960494DF}">
-              <a14:hiddenLine xmlns="" xmlns:a14="http://schemas.microsoft.com/office/drawing/2010/main" w="9525">
+              <a14:hiddenLine xmlns:a14="http://schemas.microsoft.com/office/drawing/2010/main" xmlns="" w="9525">
                 <a:solidFill>
                   <a:srgbClr val="000000"/>
                 </a:solidFill>
@@ -1791,7 +1793,7 @@
               </a14:hiddenLine>
             </a:ext>
             <a:ext uri="{FAA26D3D-D897-4be2-8F04-BA451C77F1D7}">
-              <ma14:placeholderFlag xmlns="" xmlns:ma14="http://schemas.microsoft.com/office/mac/drawingml/2011/main" val="1"/>
+              <ma14:placeholderFlag xmlns:ma14="http://schemas.microsoft.com/office/mac/drawingml/2011/main" xmlns="" val="1"/>
             </a:ext>
           </a:extLst>
         </p:spPr>
@@ -2129,14 +2131,14 @@
           </a:ln>
           <a:extLst>
             <a:ext uri="{909E8E84-426E-40dd-AFC4-6F175D3DCCD1}">
-              <a14:hiddenFill xmlns="" xmlns:a14="http://schemas.microsoft.com/office/drawing/2010/main">
+              <a14:hiddenFill xmlns:a14="http://schemas.microsoft.com/office/drawing/2010/main" xmlns="">
                 <a:solidFill>
                   <a:srgbClr val="FFFFFF"/>
                 </a:solidFill>
               </a14:hiddenFill>
             </a:ext>
             <a:ext uri="{91240B29-F687-4f45-9708-019B960494DF}">
-              <a14:hiddenLine xmlns="" xmlns:a14="http://schemas.microsoft.com/office/drawing/2010/main" w="9525">
+              <a14:hiddenLine xmlns:a14="http://schemas.microsoft.com/office/drawing/2010/main" xmlns="" w="9525">
                 <a:solidFill>
                   <a:srgbClr val="000000"/>
                 </a:solidFill>
@@ -2146,7 +2148,7 @@
               </a14:hiddenLine>
             </a:ext>
             <a:ext uri="{FAA26D3D-D897-4be2-8F04-BA451C77F1D7}">
-              <ma14:placeholderFlag xmlns="" xmlns:ma14="http://schemas.microsoft.com/office/mac/drawingml/2011/main" val="1"/>
+              <ma14:placeholderFlag xmlns:ma14="http://schemas.microsoft.com/office/mac/drawingml/2011/main" xmlns="" val="1"/>
             </a:ext>
           </a:extLst>
         </p:spPr>
@@ -4394,14 +4396,14 @@
           </a:ln>
           <a:extLst>
             <a:ext uri="{909E8E84-426E-40dd-AFC4-6F175D3DCCD1}">
-              <a14:hiddenFill xmlns="" xmlns:a14="http://schemas.microsoft.com/office/drawing/2010/main">
+              <a14:hiddenFill xmlns:a14="http://schemas.microsoft.com/office/drawing/2010/main" xmlns="">
                 <a:solidFill>
                   <a:srgbClr val="FFFFFF"/>
                 </a:solidFill>
               </a14:hiddenFill>
             </a:ext>
             <a:ext uri="{91240B29-F687-4f45-9708-019B960494DF}">
-              <a14:hiddenLine xmlns="" xmlns:a14="http://schemas.microsoft.com/office/drawing/2010/main" w="9525">
+              <a14:hiddenLine xmlns:a14="http://schemas.microsoft.com/office/drawing/2010/main" xmlns="" w="9525">
                 <a:solidFill>
                   <a:srgbClr val="000000"/>
                 </a:solidFill>
@@ -4411,7 +4413,7 @@
               </a14:hiddenLine>
             </a:ext>
             <a:ext uri="{FAA26D3D-D897-4be2-8F04-BA451C77F1D7}">
-              <ma14:placeholderFlag xmlns="" xmlns:ma14="http://schemas.microsoft.com/office/mac/drawingml/2011/main" val="1"/>
+              <ma14:placeholderFlag xmlns:ma14="http://schemas.microsoft.com/office/mac/drawingml/2011/main" xmlns="" val="1"/>
             </a:ext>
           </a:extLst>
         </p:spPr>
@@ -4455,14 +4457,14 @@
           </a:ln>
           <a:extLst>
             <a:ext uri="{909E8E84-426E-40dd-AFC4-6F175D3DCCD1}">
-              <a14:hiddenFill xmlns="" xmlns:a14="http://schemas.microsoft.com/office/drawing/2010/main">
+              <a14:hiddenFill xmlns:a14="http://schemas.microsoft.com/office/drawing/2010/main" xmlns="">
                 <a:solidFill>
                   <a:srgbClr val="FFFFFF"/>
                 </a:solidFill>
               </a14:hiddenFill>
             </a:ext>
             <a:ext uri="{91240B29-F687-4f45-9708-019B960494DF}">
-              <a14:hiddenLine xmlns="" xmlns:a14="http://schemas.microsoft.com/office/drawing/2010/main" w="9525">
+              <a14:hiddenLine xmlns:a14="http://schemas.microsoft.com/office/drawing/2010/main" xmlns="" w="9525">
                 <a:solidFill>
                   <a:srgbClr val="000000"/>
                 </a:solidFill>
@@ -4472,7 +4474,7 @@
               </a14:hiddenLine>
             </a:ext>
             <a:ext uri="{FAA26D3D-D897-4be2-8F04-BA451C77F1D7}">
-              <ma14:placeholderFlag xmlns="" xmlns:ma14="http://schemas.microsoft.com/office/mac/drawingml/2011/main" val="1"/>
+              <ma14:placeholderFlag xmlns:ma14="http://schemas.microsoft.com/office/mac/drawingml/2011/main" xmlns="" val="1"/>
             </a:ext>
           </a:extLst>
         </p:spPr>
@@ -4577,7 +4579,7 @@
           </a:ln>
           <a:extLst>
             <a:ext uri="{909E8E84-426E-40dd-AFC4-6F175D3DCCD1}">
-              <a14:hiddenFill xmlns="" xmlns:a14="http://schemas.microsoft.com/office/drawing/2010/main">
+              <a14:hiddenFill xmlns:a14="http://schemas.microsoft.com/office/drawing/2010/main" xmlns="">
                 <a:noFill/>
               </a14:hiddenFill>
             </a:ext>
@@ -4618,14 +4620,14 @@
           </a:ln>
           <a:extLst>
             <a:ext uri="{909E8E84-426E-40dd-AFC4-6F175D3DCCD1}">
-              <a14:hiddenFill xmlns="" xmlns:a14="http://schemas.microsoft.com/office/drawing/2010/main">
+              <a14:hiddenFill xmlns:a14="http://schemas.microsoft.com/office/drawing/2010/main" xmlns="">
                 <a:solidFill>
                   <a:srgbClr val="FFFFFF"/>
                 </a:solidFill>
               </a14:hiddenFill>
             </a:ext>
             <a:ext uri="{91240B29-F687-4f45-9708-019B960494DF}">
-              <a14:hiddenLine xmlns="" xmlns:a14="http://schemas.microsoft.com/office/drawing/2010/main" w="9525">
+              <a14:hiddenLine xmlns:a14="http://schemas.microsoft.com/office/drawing/2010/main" xmlns="" w="9525">
                 <a:solidFill>
                   <a:srgbClr val="000000"/>
                 </a:solidFill>
@@ -4665,14 +4667,14 @@
           </a:ln>
           <a:extLst>
             <a:ext uri="{909E8E84-426E-40dd-AFC4-6F175D3DCCD1}">
-              <a14:hiddenFill xmlns="" xmlns:a14="http://schemas.microsoft.com/office/drawing/2010/main">
+              <a14:hiddenFill xmlns:a14="http://schemas.microsoft.com/office/drawing/2010/main" xmlns="">
                 <a:solidFill>
                   <a:srgbClr val="FFFFFF"/>
                 </a:solidFill>
               </a14:hiddenFill>
             </a:ext>
             <a:ext uri="{91240B29-F687-4f45-9708-019B960494DF}">
-              <a14:hiddenLine xmlns="" xmlns:a14="http://schemas.microsoft.com/office/drawing/2010/main" w="9525">
+              <a14:hiddenLine xmlns:a14="http://schemas.microsoft.com/office/drawing/2010/main" xmlns="" w="9525">
                 <a:solidFill>
                   <a:srgbClr val="000000"/>
                 </a:solidFill>
@@ -4682,7 +4684,7 @@
               </a14:hiddenLine>
             </a:ext>
             <a:ext uri="{FAA26D3D-D897-4be2-8F04-BA451C77F1D7}">
-              <ma14:placeholderFlag xmlns="" xmlns:ma14="http://schemas.microsoft.com/office/mac/drawingml/2011/main" val="1"/>
+              <ma14:placeholderFlag xmlns:ma14="http://schemas.microsoft.com/office/mac/drawingml/2011/main" xmlns="" val="1"/>
             </a:ext>
           </a:extLst>
         </p:spPr>
@@ -5445,6 +5447,173 @@
           <p:cNvPr id="2" name="Title 1">
             <a:extLst>
               <a:ext uri="{FF2B5EF4-FFF2-40B4-BE49-F238E27FC236}">
+                <a16:creationId xmlns:a16="http://schemas.microsoft.com/office/drawing/2014/main" id="{70B6DF61-C883-A92C-33C3-C3D8AED9F08B}"/>
+              </a:ext>
+            </a:extLst>
+          </p:cNvPr>
+          <p:cNvSpPr>
+            <a:spLocks noGrp="1"/>
+          </p:cNvSpPr>
+          <p:nvPr>
+            <p:ph type="title"/>
+          </p:nvPr>
+        </p:nvSpPr>
+        <p:spPr/>
+        <p:txBody>
+          <a:bodyPr/>
+          <a:lstStyle/>
+          <a:p>
+            <a:r>
+              <a:rPr lang="en-US" dirty="0"/>
+              <a:t>Fa21 8c</a:t>
+            </a:r>
+          </a:p>
+        </p:txBody>
+      </p:sp>
+      <p:pic>
+        <p:nvPicPr>
+          <p:cNvPr id="4" name="Content Placeholder 4">
+            <a:extLst>
+              <a:ext uri="{FF2B5EF4-FFF2-40B4-BE49-F238E27FC236}">
+                <a16:creationId xmlns:a16="http://schemas.microsoft.com/office/drawing/2014/main" id="{AA1B75A4-8FAF-14CF-1FE8-6DD01E71CE5D}"/>
+              </a:ext>
+            </a:extLst>
+          </p:cNvPr>
+          <p:cNvPicPr>
+            <a:picLocks noGrp="1" noChangeAspect="1"/>
+          </p:cNvPicPr>
+          <p:nvPr>
+            <p:ph idx="1"/>
+          </p:nvPr>
+        </p:nvPicPr>
+        <p:blipFill>
+          <a:blip r:embed="rId2"/>
+          <a:stretch>
+            <a:fillRect/>
+          </a:stretch>
+        </p:blipFill>
+        <p:spPr>
+          <a:xfrm>
+            <a:off x="1798005" y="82826"/>
+            <a:ext cx="10393995" cy="6775174"/>
+          </a:xfrm>
+        </p:spPr>
+      </p:pic>
+    </p:spTree>
+    <p:extLst>
+      <p:ext uri="{BB962C8B-B14F-4D97-AF65-F5344CB8AC3E}">
+        <p14:creationId xmlns:p14="http://schemas.microsoft.com/office/powerpoint/2010/main" val="3931978604"/>
+      </p:ext>
+    </p:extLst>
+  </p:cSld>
+  <p:clrMapOvr>
+    <a:masterClrMapping/>
+  </p:clrMapOvr>
+</p:sld>
+</file>
+
+<file path=ppt/slides/slide11.xml><?xml version="1.0" encoding="utf-8"?>
+<p:sld xmlns:a="http://schemas.openxmlformats.org/drawingml/2006/main" xmlns:r="http://schemas.openxmlformats.org/officeDocument/2006/relationships" xmlns:p="http://schemas.openxmlformats.org/presentationml/2006/main">
+  <p:cSld>
+    <p:spTree>
+      <p:nvGrpSpPr>
+        <p:cNvPr id="1" name=""/>
+        <p:cNvGrpSpPr/>
+        <p:nvPr/>
+      </p:nvGrpSpPr>
+      <p:grpSpPr>
+        <a:xfrm>
+          <a:off x="0" y="0"/>
+          <a:ext cx="0" cy="0"/>
+          <a:chOff x="0" y="0"/>
+          <a:chExt cx="0" cy="0"/>
+        </a:xfrm>
+      </p:grpSpPr>
+      <p:sp>
+        <p:nvSpPr>
+          <p:cNvPr id="2" name="Title 1">
+            <a:extLst>
+              <a:ext uri="{FF2B5EF4-FFF2-40B4-BE49-F238E27FC236}">
+                <a16:creationId xmlns:a16="http://schemas.microsoft.com/office/drawing/2014/main" id="{93632FA4-CB7F-A558-F3FD-58A3EE143088}"/>
+              </a:ext>
+            </a:extLst>
+          </p:cNvPr>
+          <p:cNvSpPr>
+            <a:spLocks noGrp="1"/>
+          </p:cNvSpPr>
+          <p:nvPr>
+            <p:ph type="title"/>
+          </p:nvPr>
+        </p:nvSpPr>
+        <p:spPr/>
+        <p:txBody>
+          <a:bodyPr/>
+          <a:lstStyle/>
+          <a:p>
+            <a:endParaRPr lang="en-US"/>
+          </a:p>
+        </p:txBody>
+      </p:sp>
+      <p:sp>
+        <p:nvSpPr>
+          <p:cNvPr id="3" name="Content Placeholder 2">
+            <a:extLst>
+              <a:ext uri="{FF2B5EF4-FFF2-40B4-BE49-F238E27FC236}">
+                <a16:creationId xmlns:a16="http://schemas.microsoft.com/office/drawing/2014/main" id="{B51BEF36-F35B-45CE-988D-F70050EDC20F}"/>
+              </a:ext>
+            </a:extLst>
+          </p:cNvPr>
+          <p:cNvSpPr>
+            <a:spLocks noGrp="1"/>
+          </p:cNvSpPr>
+          <p:nvPr>
+            <p:ph idx="1"/>
+          </p:nvPr>
+        </p:nvSpPr>
+        <p:spPr/>
+        <p:txBody>
+          <a:bodyPr/>
+          <a:lstStyle/>
+          <a:p>
+            <a:endParaRPr lang="en-US"/>
+          </a:p>
+        </p:txBody>
+      </p:sp>
+    </p:spTree>
+    <p:extLst>
+      <p:ext uri="{BB962C8B-B14F-4D97-AF65-F5344CB8AC3E}">
+        <p14:creationId xmlns:p14="http://schemas.microsoft.com/office/powerpoint/2010/main" val="1431178375"/>
+      </p:ext>
+    </p:extLst>
+  </p:cSld>
+  <p:clrMapOvr>
+    <a:masterClrMapping/>
+  </p:clrMapOvr>
+</p:sld>
+</file>
+
+<file path=ppt/slides/slide12.xml><?xml version="1.0" encoding="utf-8"?>
+<p:sld xmlns:a="http://schemas.openxmlformats.org/drawingml/2006/main" xmlns:r="http://schemas.openxmlformats.org/officeDocument/2006/relationships" xmlns:p="http://schemas.openxmlformats.org/presentationml/2006/main">
+  <p:cSld>
+    <p:spTree>
+      <p:nvGrpSpPr>
+        <p:cNvPr id="1" name=""/>
+        <p:cNvGrpSpPr/>
+        <p:nvPr/>
+      </p:nvGrpSpPr>
+      <p:grpSpPr>
+        <a:xfrm>
+          <a:off x="0" y="0"/>
+          <a:ext cx="0" cy="0"/>
+          <a:chOff x="0" y="0"/>
+          <a:chExt cx="0" cy="0"/>
+        </a:xfrm>
+      </p:grpSpPr>
+      <p:sp>
+        <p:nvSpPr>
+          <p:cNvPr id="2" name="Title 1">
+            <a:extLst>
+              <a:ext uri="{FF2B5EF4-FFF2-40B4-BE49-F238E27FC236}">
                 <a16:creationId xmlns:a16="http://schemas.microsoft.com/office/drawing/2014/main" id="{12179A98-9AFA-96A0-0372-EDF2AEBE9159}"/>
               </a:ext>
             </a:extLst>
@@ -5510,7 +5679,7 @@
 </p:sld>
 </file>
 
-<file path=ppt/slides/slide11.xml><?xml version="1.0" encoding="utf-8"?>
+<file path=ppt/slides/slide13.xml><?xml version="1.0" encoding="utf-8"?>
 <p:sld xmlns:a="http://schemas.openxmlformats.org/drawingml/2006/main" xmlns:r="http://schemas.openxmlformats.org/officeDocument/2006/relationships" xmlns:p="http://schemas.openxmlformats.org/presentationml/2006/main">
   <p:cSld>
     <p:spTree>
@@ -5698,30 +5867,6 @@
             <a:pPr lvl="1"/>
             <a:r>
               <a:rPr lang="en-US" dirty="0"/>
-              <a:t> Remote Exams:</a:t>
-            </a:r>
-          </a:p>
-          <a:p>
-            <a:pPr lvl="2"/>
-            <a:r>
-              <a:rPr lang="en-US" dirty="0"/>
-              <a:t> Zoom Proctoring </a:t>
-            </a:r>
-            <a:r>
-              <a:rPr lang="en-US" dirty="0">
-                <a:hlinkClick r:id="rId2"/>
-              </a:rPr>
-              <a:t>https://docs.google.com/document/d/18Zkd-PP5qEa3hQVRhKvU9_6CmL9WVPsQMScu65D1tuI/edit?usp=sharing</a:t>
-            </a:r>
-            <a:r>
-              <a:rPr lang="en-US" dirty="0"/>
-              <a:t> </a:t>
-            </a:r>
-          </a:p>
-          <a:p>
-            <a:pPr lvl="1"/>
-            <a:r>
-              <a:rPr lang="en-US" dirty="0"/>
               <a:t> Verify Scheduling / Accommodations</a:t>
             </a:r>
           </a:p>
@@ -5907,6 +6052,261 @@
       </p:grpSpPr>
       <p:sp>
         <p:nvSpPr>
+          <p:cNvPr id="4" name="Title 3">
+            <a:extLst>
+              <a:ext uri="{FF2B5EF4-FFF2-40B4-BE49-F238E27FC236}">
+                <a16:creationId xmlns:a16="http://schemas.microsoft.com/office/drawing/2014/main" id="{5CB6DF65-B82E-CF2C-F47F-0E35790AAB54}"/>
+              </a:ext>
+            </a:extLst>
+          </p:cNvPr>
+          <p:cNvSpPr>
+            <a:spLocks noGrp="1"/>
+          </p:cNvSpPr>
+          <p:nvPr>
+            <p:ph type="ctrTitle"/>
+          </p:nvPr>
+        </p:nvSpPr>
+        <p:spPr/>
+        <p:txBody>
+          <a:bodyPr/>
+          <a:lstStyle/>
+          <a:p>
+            <a:r>
+              <a:rPr lang="en-US" dirty="0"/>
+              <a:t>Questions from Ed</a:t>
+            </a:r>
+          </a:p>
+        </p:txBody>
+      </p:sp>
+      <p:sp>
+        <p:nvSpPr>
+          <p:cNvPr id="5" name="Subtitle 4">
+            <a:extLst>
+              <a:ext uri="{FF2B5EF4-FFF2-40B4-BE49-F238E27FC236}">
+                <a16:creationId xmlns:a16="http://schemas.microsoft.com/office/drawing/2014/main" id="{42BAC8EF-8747-17DB-EC4A-6A64ABC4566D}"/>
+              </a:ext>
+            </a:extLst>
+          </p:cNvPr>
+          <p:cNvSpPr>
+            <a:spLocks noGrp="1"/>
+          </p:cNvSpPr>
+          <p:nvPr>
+            <p:ph type="subTitle" idx="1"/>
+          </p:nvPr>
+        </p:nvSpPr>
+        <p:spPr/>
+        <p:txBody>
+          <a:bodyPr/>
+          <a:lstStyle/>
+          <a:p>
+            <a:endParaRPr lang="en-US"/>
+          </a:p>
+        </p:txBody>
+      </p:sp>
+    </p:spTree>
+    <p:extLst>
+      <p:ext uri="{BB962C8B-B14F-4D97-AF65-F5344CB8AC3E}">
+        <p14:creationId xmlns:p14="http://schemas.microsoft.com/office/powerpoint/2010/main" val="4237600169"/>
+      </p:ext>
+    </p:extLst>
+  </p:cSld>
+  <p:clrMapOvr>
+    <a:masterClrMapping/>
+  </p:clrMapOvr>
+</p:sld>
+</file>
+
+<file path=ppt/slides/slide5.xml><?xml version="1.0" encoding="utf-8"?>
+<p:sld xmlns:a="http://schemas.openxmlformats.org/drawingml/2006/main" xmlns:r="http://schemas.openxmlformats.org/officeDocument/2006/relationships" xmlns:p="http://schemas.openxmlformats.org/presentationml/2006/main">
+  <p:cSld>
+    <p:spTree>
+      <p:nvGrpSpPr>
+        <p:cNvPr id="1" name=""/>
+        <p:cNvGrpSpPr/>
+        <p:nvPr/>
+      </p:nvGrpSpPr>
+      <p:grpSpPr>
+        <a:xfrm>
+          <a:off x="0" y="0"/>
+          <a:ext cx="0" cy="0"/>
+          <a:chOff x="0" y="0"/>
+          <a:chExt cx="0" cy="0"/>
+        </a:xfrm>
+      </p:grpSpPr>
+      <p:sp>
+        <p:nvSpPr>
+          <p:cNvPr id="2" name="Title 1">
+            <a:extLst>
+              <a:ext uri="{FF2B5EF4-FFF2-40B4-BE49-F238E27FC236}">
+                <a16:creationId xmlns:a16="http://schemas.microsoft.com/office/drawing/2014/main" id="{1A3723B1-E4EB-E4AC-5A75-A161213FCEEF}"/>
+              </a:ext>
+            </a:extLst>
+          </p:cNvPr>
+          <p:cNvSpPr>
+            <a:spLocks noGrp="1"/>
+          </p:cNvSpPr>
+          <p:nvPr>
+            <p:ph type="title"/>
+          </p:nvPr>
+        </p:nvSpPr>
+        <p:spPr/>
+        <p:txBody>
+          <a:bodyPr/>
+          <a:lstStyle/>
+          <a:p>
+            <a:r>
+              <a:rPr lang="en-US" dirty="0"/>
+              <a:t>OOP Questions</a:t>
+            </a:r>
+          </a:p>
+        </p:txBody>
+      </p:sp>
+      <p:sp>
+        <p:nvSpPr>
+          <p:cNvPr id="3" name="Content Placeholder 2">
+            <a:extLst>
+              <a:ext uri="{FF2B5EF4-FFF2-40B4-BE49-F238E27FC236}">
+                <a16:creationId xmlns:a16="http://schemas.microsoft.com/office/drawing/2014/main" id="{6DBD37CB-E835-AC88-946B-EE2E0029AE39}"/>
+              </a:ext>
+            </a:extLst>
+          </p:cNvPr>
+          <p:cNvSpPr>
+            <a:spLocks noGrp="1"/>
+          </p:cNvSpPr>
+          <p:nvPr>
+            <p:ph idx="1"/>
+          </p:nvPr>
+        </p:nvSpPr>
+        <p:spPr/>
+        <p:txBody>
+          <a:bodyPr/>
+          <a:lstStyle/>
+          <a:p>
+            <a:r>
+              <a:rPr lang="en-US" dirty="0"/>
+              <a:t>super() is a method which refers to the </a:t>
+            </a:r>
+            <a:r>
+              <a:rPr lang="en-US" i="1" dirty="0"/>
+              <a:t>parent class</a:t>
+            </a:r>
+            <a:r>
+              <a:rPr lang="en-US" dirty="0"/>
+              <a:t> of an object.</a:t>
+            </a:r>
+          </a:p>
+          <a:p>
+            <a:pPr lvl="1"/>
+            <a:r>
+              <a:rPr lang="en-US" dirty="0"/>
+              <a:t> It returns a special kind of instance of an object. </a:t>
+            </a:r>
+          </a:p>
+          <a:p>
+            <a:pPr lvl="1"/>
+            <a:r>
+              <a:rPr lang="en-US" dirty="0"/>
+              <a:t>We can use super() or the class name of the parent class</a:t>
+            </a:r>
+          </a:p>
+          <a:p>
+            <a:r>
+              <a:rPr lang="en-US" dirty="0"/>
+              <a:t>Private Attributes and Methods:</a:t>
+            </a:r>
+          </a:p>
+          <a:p>
+            <a:pPr lvl="1"/>
+            <a:r>
+              <a:rPr lang="en-US" dirty="0"/>
+              <a:t> </a:t>
+            </a:r>
+            <a:r>
+              <a:rPr lang="en-US" dirty="0" err="1"/>
+              <a:t>self.x</a:t>
+            </a:r>
+            <a:r>
+              <a:rPr lang="en-US" dirty="0"/>
+              <a:t> is "public"</a:t>
+            </a:r>
+          </a:p>
+          <a:p>
+            <a:pPr lvl="1"/>
+            <a:r>
+              <a:rPr lang="en-US" dirty="0" err="1"/>
+              <a:t>self._x</a:t>
+            </a:r>
+            <a:r>
+              <a:rPr lang="en-US" dirty="0"/>
+              <a:t> is a </a:t>
+            </a:r>
+            <a:r>
+              <a:rPr lang="en-US" i="1" dirty="0"/>
+              <a:t>convention </a:t>
+            </a:r>
+            <a:r>
+              <a:rPr lang="en-US" dirty="0"/>
+              <a:t>which means "you shouldn't use this"</a:t>
+            </a:r>
+          </a:p>
+          <a:p>
+            <a:pPr lvl="1"/>
+            <a:r>
+              <a:rPr lang="en-US" dirty="0" err="1"/>
+              <a:t>self.__x</a:t>
+            </a:r>
+            <a:r>
+              <a:rPr lang="en-US" dirty="0"/>
+              <a:t> is </a:t>
+            </a:r>
+            <a:r>
+              <a:rPr lang="en-US" i="1" dirty="0"/>
+              <a:t>private. </a:t>
+            </a:r>
+            <a:r>
+              <a:rPr lang="en-US" dirty="0"/>
+              <a:t>Python prevents other classes from accessing </a:t>
+            </a:r>
+            <a:r>
+              <a:rPr lang="en-US"/>
+              <a:t>that attribute.</a:t>
+            </a:r>
+            <a:endParaRPr lang="en-US" dirty="0"/>
+          </a:p>
+        </p:txBody>
+      </p:sp>
+    </p:spTree>
+    <p:extLst>
+      <p:ext uri="{BB962C8B-B14F-4D97-AF65-F5344CB8AC3E}">
+        <p14:creationId xmlns:p14="http://schemas.microsoft.com/office/powerpoint/2010/main" val="145764747"/>
+      </p:ext>
+    </p:extLst>
+  </p:cSld>
+  <p:clrMapOvr>
+    <a:masterClrMapping/>
+  </p:clrMapOvr>
+</p:sld>
+</file>
+
+<file path=ppt/slides/slide6.xml><?xml version="1.0" encoding="utf-8"?>
+<p:sld xmlns:a="http://schemas.openxmlformats.org/drawingml/2006/main" xmlns:r="http://schemas.openxmlformats.org/officeDocument/2006/relationships" xmlns:p="http://schemas.openxmlformats.org/presentationml/2006/main">
+  <p:cSld>
+    <p:spTree>
+      <p:nvGrpSpPr>
+        <p:cNvPr id="1" name=""/>
+        <p:cNvGrpSpPr/>
+        <p:nvPr/>
+      </p:nvGrpSpPr>
+      <p:grpSpPr>
+        <a:xfrm>
+          <a:off x="0" y="0"/>
+          <a:ext cx="0" cy="0"/>
+          <a:chOff x="0" y="0"/>
+          <a:chExt cx="0" cy="0"/>
+        </a:xfrm>
+      </p:grpSpPr>
+      <p:sp>
+        <p:nvSpPr>
           <p:cNvPr id="2" name="Title 1">
             <a:extLst>
               <a:ext uri="{FF2B5EF4-FFF2-40B4-BE49-F238E27FC236}">
@@ -5975,7 +6375,7 @@
 </p:sld>
 </file>
 
-<file path=ppt/slides/slide5.xml><?xml version="1.0" encoding="utf-8"?>
+<file path=ppt/slides/slide7.xml><?xml version="1.0" encoding="utf-8"?>
 <p:sld xmlns:a="http://schemas.openxmlformats.org/drawingml/2006/main" xmlns:r="http://schemas.openxmlformats.org/officeDocument/2006/relationships" xmlns:p="http://schemas.openxmlformats.org/presentationml/2006/main">
   <p:cSld>
     <p:spTree>
@@ -6085,7 +6485,7 @@
 </p:sld>
 </file>
 
-<file path=ppt/slides/slide6.xml><?xml version="1.0" encoding="utf-8"?>
+<file path=ppt/slides/slide8.xml><?xml version="1.0" encoding="utf-8"?>
 <p:sld xmlns:a="http://schemas.openxmlformats.org/drawingml/2006/main" xmlns:r="http://schemas.openxmlformats.org/officeDocument/2006/relationships" xmlns:p="http://schemas.openxmlformats.org/presentationml/2006/main">
   <p:cSld>
     <p:spTree>
@@ -6189,14 +6589,14 @@
           </a:ln>
           <a:extLst>
             <a:ext uri="{909E8E84-426E-40dd-AFC4-6F175D3DCCD1}">
-              <a14:hiddenFill xmlns="" xmlns:a14="http://schemas.microsoft.com/office/drawing/2010/main">
+              <a14:hiddenFill xmlns:a14="http://schemas.microsoft.com/office/drawing/2010/main" xmlns="">
                 <a:solidFill>
                   <a:srgbClr val="FFFFFF"/>
                 </a:solidFill>
               </a14:hiddenFill>
             </a:ext>
             <a:ext uri="{91240B29-F687-4f45-9708-019B960494DF}">
-              <a14:hiddenLine xmlns="" xmlns:a14="http://schemas.microsoft.com/office/drawing/2010/main" w="9525">
+              <a14:hiddenLine xmlns:a14="http://schemas.microsoft.com/office/drawing/2010/main" xmlns="" w="9525">
                 <a:solidFill>
                   <a:srgbClr val="000000"/>
                 </a:solidFill>
@@ -6206,7 +6606,7 @@
               </a14:hiddenLine>
             </a:ext>
             <a:ext uri="{FAA26D3D-D897-4be2-8F04-BA451C77F1D7}">
-              <ma14:placeholderFlag xmlns="" xmlns:ma14="http://schemas.microsoft.com/office/mac/drawingml/2011/main" val="1"/>
+              <ma14:placeholderFlag xmlns:ma14="http://schemas.microsoft.com/office/mac/drawingml/2011/main" xmlns="" val="1"/>
             </a:ext>
           </a:extLst>
         </p:spPr>
@@ -6224,7 +6624,7 @@
 </p:sld>
 </file>
 
-<file path=ppt/slides/slide7.xml><?xml version="1.0" encoding="utf-8"?>
+<file path=ppt/slides/slide9.xml><?xml version="1.0" encoding="utf-8"?>
 <p:sld xmlns:a="http://schemas.openxmlformats.org/drawingml/2006/main" xmlns:r="http://schemas.openxmlformats.org/officeDocument/2006/relationships" xmlns:p="http://schemas.openxmlformats.org/presentationml/2006/main">
   <p:cSld>
     <p:spTree>
@@ -6295,173 +6695,6 @@
     <p:extLst>
       <p:ext uri="{BB962C8B-B14F-4D97-AF65-F5344CB8AC3E}">
         <p14:creationId xmlns:p14="http://schemas.microsoft.com/office/powerpoint/2010/main" val="1912638304"/>
-      </p:ext>
-    </p:extLst>
-  </p:cSld>
-  <p:clrMapOvr>
-    <a:masterClrMapping/>
-  </p:clrMapOvr>
-</p:sld>
-</file>
-
-<file path=ppt/slides/slide8.xml><?xml version="1.0" encoding="utf-8"?>
-<p:sld xmlns:a="http://schemas.openxmlformats.org/drawingml/2006/main" xmlns:r="http://schemas.openxmlformats.org/officeDocument/2006/relationships" xmlns:p="http://schemas.openxmlformats.org/presentationml/2006/main">
-  <p:cSld>
-    <p:spTree>
-      <p:nvGrpSpPr>
-        <p:cNvPr id="1" name=""/>
-        <p:cNvGrpSpPr/>
-        <p:nvPr/>
-      </p:nvGrpSpPr>
-      <p:grpSpPr>
-        <a:xfrm>
-          <a:off x="0" y="0"/>
-          <a:ext cx="0" cy="0"/>
-          <a:chOff x="0" y="0"/>
-          <a:chExt cx="0" cy="0"/>
-        </a:xfrm>
-      </p:grpSpPr>
-      <p:sp>
-        <p:nvSpPr>
-          <p:cNvPr id="2" name="Title 1">
-            <a:extLst>
-              <a:ext uri="{FF2B5EF4-FFF2-40B4-BE49-F238E27FC236}">
-                <a16:creationId xmlns:a16="http://schemas.microsoft.com/office/drawing/2014/main" id="{70B6DF61-C883-A92C-33C3-C3D8AED9F08B}"/>
-              </a:ext>
-            </a:extLst>
-          </p:cNvPr>
-          <p:cNvSpPr>
-            <a:spLocks noGrp="1"/>
-          </p:cNvSpPr>
-          <p:nvPr>
-            <p:ph type="title"/>
-          </p:nvPr>
-        </p:nvSpPr>
-        <p:spPr/>
-        <p:txBody>
-          <a:bodyPr/>
-          <a:lstStyle/>
-          <a:p>
-            <a:r>
-              <a:rPr lang="en-US" dirty="0"/>
-              <a:t>Fa21 8c</a:t>
-            </a:r>
-          </a:p>
-        </p:txBody>
-      </p:sp>
-      <p:pic>
-        <p:nvPicPr>
-          <p:cNvPr id="4" name="Content Placeholder 4">
-            <a:extLst>
-              <a:ext uri="{FF2B5EF4-FFF2-40B4-BE49-F238E27FC236}">
-                <a16:creationId xmlns:a16="http://schemas.microsoft.com/office/drawing/2014/main" id="{AA1B75A4-8FAF-14CF-1FE8-6DD01E71CE5D}"/>
-              </a:ext>
-            </a:extLst>
-          </p:cNvPr>
-          <p:cNvPicPr>
-            <a:picLocks noGrp="1" noChangeAspect="1"/>
-          </p:cNvPicPr>
-          <p:nvPr>
-            <p:ph idx="1"/>
-          </p:nvPr>
-        </p:nvPicPr>
-        <p:blipFill>
-          <a:blip r:embed="rId2"/>
-          <a:stretch>
-            <a:fillRect/>
-          </a:stretch>
-        </p:blipFill>
-        <p:spPr>
-          <a:xfrm>
-            <a:off x="1798005" y="82826"/>
-            <a:ext cx="10393995" cy="6775174"/>
-          </a:xfrm>
-        </p:spPr>
-      </p:pic>
-    </p:spTree>
-    <p:extLst>
-      <p:ext uri="{BB962C8B-B14F-4D97-AF65-F5344CB8AC3E}">
-        <p14:creationId xmlns:p14="http://schemas.microsoft.com/office/powerpoint/2010/main" val="3931978604"/>
-      </p:ext>
-    </p:extLst>
-  </p:cSld>
-  <p:clrMapOvr>
-    <a:masterClrMapping/>
-  </p:clrMapOvr>
-</p:sld>
-</file>
-
-<file path=ppt/slides/slide9.xml><?xml version="1.0" encoding="utf-8"?>
-<p:sld xmlns:a="http://schemas.openxmlformats.org/drawingml/2006/main" xmlns:r="http://schemas.openxmlformats.org/officeDocument/2006/relationships" xmlns:p="http://schemas.openxmlformats.org/presentationml/2006/main">
-  <p:cSld>
-    <p:spTree>
-      <p:nvGrpSpPr>
-        <p:cNvPr id="1" name=""/>
-        <p:cNvGrpSpPr/>
-        <p:nvPr/>
-      </p:nvGrpSpPr>
-      <p:grpSpPr>
-        <a:xfrm>
-          <a:off x="0" y="0"/>
-          <a:ext cx="0" cy="0"/>
-          <a:chOff x="0" y="0"/>
-          <a:chExt cx="0" cy="0"/>
-        </a:xfrm>
-      </p:grpSpPr>
-      <p:sp>
-        <p:nvSpPr>
-          <p:cNvPr id="2" name="Title 1">
-            <a:extLst>
-              <a:ext uri="{FF2B5EF4-FFF2-40B4-BE49-F238E27FC236}">
-                <a16:creationId xmlns:a16="http://schemas.microsoft.com/office/drawing/2014/main" id="{93632FA4-CB7F-A558-F3FD-58A3EE143088}"/>
-              </a:ext>
-            </a:extLst>
-          </p:cNvPr>
-          <p:cNvSpPr>
-            <a:spLocks noGrp="1"/>
-          </p:cNvSpPr>
-          <p:nvPr>
-            <p:ph type="title"/>
-          </p:nvPr>
-        </p:nvSpPr>
-        <p:spPr/>
-        <p:txBody>
-          <a:bodyPr/>
-          <a:lstStyle/>
-          <a:p>
-            <a:endParaRPr lang="en-US"/>
-          </a:p>
-        </p:txBody>
-      </p:sp>
-      <p:sp>
-        <p:nvSpPr>
-          <p:cNvPr id="3" name="Content Placeholder 2">
-            <a:extLst>
-              <a:ext uri="{FF2B5EF4-FFF2-40B4-BE49-F238E27FC236}">
-                <a16:creationId xmlns:a16="http://schemas.microsoft.com/office/drawing/2014/main" id="{B51BEF36-F35B-45CE-988D-F70050EDC20F}"/>
-              </a:ext>
-            </a:extLst>
-          </p:cNvPr>
-          <p:cNvSpPr>
-            <a:spLocks noGrp="1"/>
-          </p:cNvSpPr>
-          <p:nvPr>
-            <p:ph idx="1"/>
-          </p:nvPr>
-        </p:nvSpPr>
-        <p:spPr/>
-        <p:txBody>
-          <a:bodyPr/>
-          <a:lstStyle/>
-          <a:p>
-            <a:endParaRPr lang="en-US"/>
-          </a:p>
-        </p:txBody>
-      </p:sp>
-    </p:spTree>
-    <p:extLst>
-      <p:ext uri="{BB962C8B-B14F-4D97-AF65-F5344CB8AC3E}">
-        <p14:creationId xmlns:p14="http://schemas.microsoft.com/office/powerpoint/2010/main" val="1431178375"/>
       </p:ext>
     </p:extLst>
   </p:cSld>

</xml_diff>

<commit_message>
Deploy website Wed Oct 19 20:29:27 PDT 2022
</commit_message>
<xml_diff>
--- a/assets/slides/fa22/16-Midterm_Review.pptx
+++ b/assets/slides/fa22/16-Midterm_Review.pptx
@@ -5,7 +5,7 @@
     <p:sldMasterId id="2147483659" r:id="rId1"/>
   </p:sldMasterIdLst>
   <p:notesMasterIdLst>
-    <p:notesMasterId r:id="rId15"/>
+    <p:notesMasterId r:id="rId19"/>
   </p:notesMasterIdLst>
   <p:sldIdLst>
     <p:sldId id="256" r:id="rId2"/>
@@ -13,34 +13,38 @@
     <p:sldId id="260" r:id="rId4"/>
     <p:sldId id="269" r:id="rId5"/>
     <p:sldId id="270" r:id="rId6"/>
-    <p:sldId id="261" r:id="rId7"/>
-    <p:sldId id="265" r:id="rId8"/>
-    <p:sldId id="262" r:id="rId9"/>
-    <p:sldId id="266" r:id="rId10"/>
-    <p:sldId id="263" r:id="rId11"/>
-    <p:sldId id="267" r:id="rId12"/>
-    <p:sldId id="264" r:id="rId13"/>
-    <p:sldId id="268" r:id="rId14"/>
+    <p:sldId id="272" r:id="rId7"/>
+    <p:sldId id="271" r:id="rId8"/>
+    <p:sldId id="273" r:id="rId9"/>
+    <p:sldId id="274" r:id="rId10"/>
+    <p:sldId id="261" r:id="rId11"/>
+    <p:sldId id="265" r:id="rId12"/>
+    <p:sldId id="262" r:id="rId13"/>
+    <p:sldId id="266" r:id="rId14"/>
+    <p:sldId id="263" r:id="rId15"/>
+    <p:sldId id="267" r:id="rId16"/>
+    <p:sldId id="264" r:id="rId17"/>
+    <p:sldId id="268" r:id="rId18"/>
   </p:sldIdLst>
   <p:sldSz cx="12192000" cy="6858000"/>
   <p:notesSz cx="6997700" cy="9194800"/>
   <p:embeddedFontLst>
     <p:embeddedFont>
       <p:font typeface="FreightSans Pro Medium" panose="02000606030000020004" pitchFamily="2" charset="0"/>
-      <p:regular r:id="rId16"/>
-      <p:italic r:id="rId17"/>
+      <p:regular r:id="rId20"/>
+      <p:italic r:id="rId21"/>
     </p:embeddedFont>
     <p:embeddedFont>
       <p:font typeface="FreightSans Pro Semibold" panose="02000606030000020004" pitchFamily="2" charset="0"/>
-      <p:regular r:id="rId18"/>
-      <p:bold r:id="rId19"/>
-      <p:italic r:id="rId20"/>
-      <p:boldItalic r:id="rId21"/>
+      <p:regular r:id="rId22"/>
+      <p:bold r:id="rId23"/>
+      <p:italic r:id="rId24"/>
+      <p:boldItalic r:id="rId25"/>
     </p:embeddedFont>
     <p:embeddedFont>
       <p:font typeface="FreightText Pro Book" panose="02000603060000020004" pitchFamily="2" charset="0"/>
-      <p:regular r:id="rId22"/>
-      <p:italic r:id="rId23"/>
+      <p:regular r:id="rId26"/>
+      <p:italic r:id="rId27"/>
     </p:embeddedFont>
   </p:embeddedFontLst>
   <p:defaultTextStyle>
@@ -5447,6 +5451,422 @@
           <p:cNvPr id="2" name="Title 1">
             <a:extLst>
               <a:ext uri="{FF2B5EF4-FFF2-40B4-BE49-F238E27FC236}">
+                <a16:creationId xmlns:a16="http://schemas.microsoft.com/office/drawing/2014/main" id="{E82EB9BD-23F7-3546-09B0-646A6768A93A}"/>
+              </a:ext>
+            </a:extLst>
+          </p:cNvPr>
+          <p:cNvSpPr>
+            <a:spLocks noGrp="1"/>
+          </p:cNvSpPr>
+          <p:nvPr>
+            <p:ph type="title"/>
+          </p:nvPr>
+        </p:nvSpPr>
+        <p:spPr/>
+        <p:txBody>
+          <a:bodyPr/>
+          <a:lstStyle/>
+          <a:p>
+            <a:r>
+              <a:rPr lang="en-US" dirty="0"/>
+              <a:t>SP20 #6</a:t>
+            </a:r>
+          </a:p>
+        </p:txBody>
+      </p:sp>
+      <p:pic>
+        <p:nvPicPr>
+          <p:cNvPr id="10" name="Content Placeholder 9" descr="Text, letter&#10;&#10;Description automatically generated">
+            <a:extLst>
+              <a:ext uri="{FF2B5EF4-FFF2-40B4-BE49-F238E27FC236}">
+                <a16:creationId xmlns:a16="http://schemas.microsoft.com/office/drawing/2014/main" id="{CDDA6128-6E8D-C966-2B62-9EC1AAD38870}"/>
+              </a:ext>
+            </a:extLst>
+          </p:cNvPr>
+          <p:cNvPicPr>
+            <a:picLocks noGrp="1" noChangeAspect="1"/>
+          </p:cNvPicPr>
+          <p:nvPr>
+            <p:ph idx="1"/>
+          </p:nvPr>
+        </p:nvPicPr>
+        <p:blipFill>
+          <a:blip r:embed="rId2"/>
+          <a:stretch>
+            <a:fillRect/>
+          </a:stretch>
+        </p:blipFill>
+        <p:spPr>
+          <a:xfrm>
+            <a:off x="3414809" y="87292"/>
+            <a:ext cx="8483591" cy="6683415"/>
+          </a:xfrm>
+        </p:spPr>
+      </p:pic>
+    </p:spTree>
+    <p:extLst>
+      <p:ext uri="{BB962C8B-B14F-4D97-AF65-F5344CB8AC3E}">
+        <p14:creationId xmlns:p14="http://schemas.microsoft.com/office/powerpoint/2010/main" val="1600643390"/>
+      </p:ext>
+    </p:extLst>
+  </p:cSld>
+  <p:clrMapOvr>
+    <a:masterClrMapping/>
+  </p:clrMapOvr>
+</p:sld>
+</file>
+
+<file path=ppt/slides/slide11.xml><?xml version="1.0" encoding="utf-8"?>
+<p:sld xmlns:a="http://schemas.openxmlformats.org/drawingml/2006/main" xmlns:r="http://schemas.openxmlformats.org/officeDocument/2006/relationships" xmlns:p="http://schemas.openxmlformats.org/presentationml/2006/main">
+  <p:cSld>
+    <p:spTree>
+      <p:nvGrpSpPr>
+        <p:cNvPr id="1" name=""/>
+        <p:cNvGrpSpPr/>
+        <p:nvPr/>
+      </p:nvGrpSpPr>
+      <p:grpSpPr>
+        <a:xfrm>
+          <a:off x="0" y="0"/>
+          <a:ext cx="0" cy="0"/>
+          <a:chOff x="0" y="0"/>
+          <a:chExt cx="0" cy="0"/>
+        </a:xfrm>
+      </p:grpSpPr>
+      <p:sp>
+        <p:nvSpPr>
+          <p:cNvPr id="2" name="Title 1">
+            <a:extLst>
+              <a:ext uri="{FF2B5EF4-FFF2-40B4-BE49-F238E27FC236}">
+                <a16:creationId xmlns:a16="http://schemas.microsoft.com/office/drawing/2014/main" id="{7241903F-7AFF-74C0-F4A3-680355801035}"/>
+              </a:ext>
+            </a:extLst>
+          </p:cNvPr>
+          <p:cNvSpPr>
+            <a:spLocks noGrp="1"/>
+          </p:cNvSpPr>
+          <p:nvPr>
+            <p:ph type="title"/>
+          </p:nvPr>
+        </p:nvSpPr>
+        <p:spPr/>
+        <p:txBody>
+          <a:bodyPr/>
+          <a:lstStyle/>
+          <a:p>
+            <a:endParaRPr lang="en-US"/>
+          </a:p>
+        </p:txBody>
+      </p:sp>
+      <p:sp>
+        <p:nvSpPr>
+          <p:cNvPr id="3" name="Content Placeholder 2">
+            <a:extLst>
+              <a:ext uri="{FF2B5EF4-FFF2-40B4-BE49-F238E27FC236}">
+                <a16:creationId xmlns:a16="http://schemas.microsoft.com/office/drawing/2014/main" id="{BC6410A9-9F8E-EF96-1BAF-CE99175AEA90}"/>
+              </a:ext>
+            </a:extLst>
+          </p:cNvPr>
+          <p:cNvSpPr>
+            <a:spLocks noGrp="1"/>
+          </p:cNvSpPr>
+          <p:nvPr>
+            <p:ph idx="1"/>
+          </p:nvPr>
+        </p:nvSpPr>
+        <p:spPr/>
+        <p:txBody>
+          <a:bodyPr/>
+          <a:lstStyle/>
+          <a:p>
+            <a:endParaRPr lang="en-US"/>
+          </a:p>
+        </p:txBody>
+      </p:sp>
+      <p:pic>
+        <p:nvPicPr>
+          <p:cNvPr id="4" name="Picture 3" descr="Text, letter&#10;&#10;Description automatically generated">
+            <a:extLst>
+              <a:ext uri="{FF2B5EF4-FFF2-40B4-BE49-F238E27FC236}">
+                <a16:creationId xmlns:a16="http://schemas.microsoft.com/office/drawing/2014/main" id="{6434438D-A105-87C6-29E4-B33765752D82}"/>
+              </a:ext>
+            </a:extLst>
+          </p:cNvPr>
+          <p:cNvPicPr>
+            <a:picLocks noChangeAspect="1"/>
+          </p:cNvPicPr>
+          <p:nvPr/>
+        </p:nvPicPr>
+        <p:blipFill>
+          <a:blip r:embed="rId2"/>
+          <a:stretch>
+            <a:fillRect/>
+          </a:stretch>
+        </p:blipFill>
+        <p:spPr>
+          <a:xfrm>
+            <a:off x="0" y="1141900"/>
+            <a:ext cx="12192000" cy="4574199"/>
+          </a:xfrm>
+          <a:prstGeom prst="rect">
+            <a:avLst/>
+          </a:prstGeom>
+        </p:spPr>
+      </p:pic>
+    </p:spTree>
+    <p:extLst>
+      <p:ext uri="{BB962C8B-B14F-4D97-AF65-F5344CB8AC3E}">
+        <p14:creationId xmlns:p14="http://schemas.microsoft.com/office/powerpoint/2010/main" val="1531018008"/>
+      </p:ext>
+    </p:extLst>
+  </p:cSld>
+  <p:clrMapOvr>
+    <a:masterClrMapping/>
+  </p:clrMapOvr>
+</p:sld>
+</file>
+
+<file path=ppt/slides/slide12.xml><?xml version="1.0" encoding="utf-8"?>
+<p:sld xmlns:a="http://schemas.openxmlformats.org/drawingml/2006/main" xmlns:r="http://schemas.openxmlformats.org/officeDocument/2006/relationships" xmlns:p="http://schemas.openxmlformats.org/presentationml/2006/main">
+  <p:cSld>
+    <p:spTree>
+      <p:nvGrpSpPr>
+        <p:cNvPr id="1" name=""/>
+        <p:cNvGrpSpPr/>
+        <p:nvPr/>
+      </p:nvGrpSpPr>
+      <p:grpSpPr>
+        <a:xfrm>
+          <a:off x="0" y="0"/>
+          <a:ext cx="0" cy="0"/>
+          <a:chOff x="0" y="0"/>
+          <a:chExt cx="0" cy="0"/>
+        </a:xfrm>
+      </p:grpSpPr>
+      <p:sp>
+        <p:nvSpPr>
+          <p:cNvPr id="2" name="Title 1">
+            <a:extLst>
+              <a:ext uri="{FF2B5EF4-FFF2-40B4-BE49-F238E27FC236}">
+                <a16:creationId xmlns:a16="http://schemas.microsoft.com/office/drawing/2014/main" id="{0063C65A-3343-67FC-B03E-36AF156FA4F7}"/>
+              </a:ext>
+            </a:extLst>
+          </p:cNvPr>
+          <p:cNvSpPr>
+            <a:spLocks noGrp="1"/>
+          </p:cNvSpPr>
+          <p:nvPr>
+            <p:ph type="title"/>
+          </p:nvPr>
+        </p:nvSpPr>
+        <p:spPr/>
+        <p:txBody>
+          <a:bodyPr/>
+          <a:lstStyle/>
+          <a:p>
+            <a:r>
+              <a:rPr lang="en-US" dirty="0"/>
+              <a:t>Fall 2019  #6</a:t>
+            </a:r>
+          </a:p>
+        </p:txBody>
+      </p:sp>
+      <p:sp>
+        <p:nvSpPr>
+          <p:cNvPr id="3" name="Content Placeholder 2">
+            <a:extLst>
+              <a:ext uri="{FF2B5EF4-FFF2-40B4-BE49-F238E27FC236}">
+                <a16:creationId xmlns:a16="http://schemas.microsoft.com/office/drawing/2014/main" id="{248C76F7-115E-A2DF-5F65-803EC7C27100}"/>
+              </a:ext>
+            </a:extLst>
+          </p:cNvPr>
+          <p:cNvSpPr>
+            <a:spLocks noGrp="1"/>
+          </p:cNvSpPr>
+          <p:nvPr>
+            <p:ph idx="1"/>
+          </p:nvPr>
+        </p:nvSpPr>
+        <p:spPr/>
+        <p:txBody>
+          <a:bodyPr/>
+          <a:lstStyle/>
+          <a:p>
+            <a:endParaRPr lang="en-US"/>
+          </a:p>
+        </p:txBody>
+      </p:sp>
+      <p:pic>
+        <p:nvPicPr>
+          <p:cNvPr id="4" name="Content Placeholder 4" descr="Text, letter&#10;&#10;Description automatically generated">
+            <a:extLst>
+              <a:ext uri="{FF2B5EF4-FFF2-40B4-BE49-F238E27FC236}">
+                <a16:creationId xmlns:a16="http://schemas.microsoft.com/office/drawing/2014/main" id="{3CF6B68D-5EF3-F4F5-445F-759A32926B97}"/>
+              </a:ext>
+            </a:extLst>
+          </p:cNvPr>
+          <p:cNvPicPr>
+            <a:picLocks noChangeAspect="1"/>
+          </p:cNvPicPr>
+          <p:nvPr/>
+        </p:nvPicPr>
+        <p:blipFill>
+          <a:blip r:embed="rId2"/>
+          <a:stretch>
+            <a:fillRect/>
+          </a:stretch>
+        </p:blipFill>
+        <p:spPr bwMode="auto">
+          <a:xfrm>
+            <a:off x="736655" y="1066800"/>
+            <a:ext cx="10718690" cy="5257800"/>
+          </a:xfrm>
+          <a:prstGeom prst="rect">
+            <a:avLst/>
+          </a:prstGeom>
+          <a:noFill/>
+          <a:ln>
+            <a:noFill/>
+          </a:ln>
+          <a:extLst>
+            <a:ext uri="{909E8E84-426E-40dd-AFC4-6F175D3DCCD1}">
+              <a14:hiddenFill xmlns:a14="http://schemas.microsoft.com/office/drawing/2010/main" xmlns="">
+                <a:solidFill>
+                  <a:srgbClr val="FFFFFF"/>
+                </a:solidFill>
+              </a14:hiddenFill>
+            </a:ext>
+            <a:ext uri="{91240B29-F687-4f45-9708-019B960494DF}">
+              <a14:hiddenLine xmlns:a14="http://schemas.microsoft.com/office/drawing/2010/main" xmlns="" w="9525">
+                <a:solidFill>
+                  <a:srgbClr val="000000"/>
+                </a:solidFill>
+                <a:miter lim="800000"/>
+                <a:headEnd/>
+                <a:tailEnd/>
+              </a14:hiddenLine>
+            </a:ext>
+            <a:ext uri="{FAA26D3D-D897-4be2-8F04-BA451C77F1D7}">
+              <ma14:placeholderFlag xmlns:ma14="http://schemas.microsoft.com/office/mac/drawingml/2011/main" xmlns="" val="1"/>
+            </a:ext>
+          </a:extLst>
+        </p:spPr>
+      </p:pic>
+    </p:spTree>
+    <p:extLst>
+      <p:ext uri="{BB962C8B-B14F-4D97-AF65-F5344CB8AC3E}">
+        <p14:creationId xmlns:p14="http://schemas.microsoft.com/office/powerpoint/2010/main" val="3432139222"/>
+      </p:ext>
+    </p:extLst>
+  </p:cSld>
+  <p:clrMapOvr>
+    <a:masterClrMapping/>
+  </p:clrMapOvr>
+</p:sld>
+</file>
+
+<file path=ppt/slides/slide13.xml><?xml version="1.0" encoding="utf-8"?>
+<p:sld xmlns:a="http://schemas.openxmlformats.org/drawingml/2006/main" xmlns:r="http://schemas.openxmlformats.org/officeDocument/2006/relationships" xmlns:p="http://schemas.openxmlformats.org/presentationml/2006/main">
+  <p:cSld>
+    <p:spTree>
+      <p:nvGrpSpPr>
+        <p:cNvPr id="1" name=""/>
+        <p:cNvGrpSpPr/>
+        <p:nvPr/>
+      </p:nvGrpSpPr>
+      <p:grpSpPr>
+        <a:xfrm>
+          <a:off x="0" y="0"/>
+          <a:ext cx="0" cy="0"/>
+          <a:chOff x="0" y="0"/>
+          <a:chExt cx="0" cy="0"/>
+        </a:xfrm>
+      </p:grpSpPr>
+      <p:sp>
+        <p:nvSpPr>
+          <p:cNvPr id="2" name="Title 1">
+            <a:extLst>
+              <a:ext uri="{FF2B5EF4-FFF2-40B4-BE49-F238E27FC236}">
+                <a16:creationId xmlns:a16="http://schemas.microsoft.com/office/drawing/2014/main" id="{7088AF82-6302-1F34-6280-ED0F172821AA}"/>
+              </a:ext>
+            </a:extLst>
+          </p:cNvPr>
+          <p:cNvSpPr>
+            <a:spLocks noGrp="1"/>
+          </p:cNvSpPr>
+          <p:nvPr>
+            <p:ph type="title"/>
+          </p:nvPr>
+        </p:nvSpPr>
+        <p:spPr/>
+        <p:txBody>
+          <a:bodyPr/>
+          <a:lstStyle/>
+          <a:p>
+            <a:endParaRPr lang="en-US"/>
+          </a:p>
+        </p:txBody>
+      </p:sp>
+      <p:sp>
+        <p:nvSpPr>
+          <p:cNvPr id="3" name="Content Placeholder 2">
+            <a:extLst>
+              <a:ext uri="{FF2B5EF4-FFF2-40B4-BE49-F238E27FC236}">
+                <a16:creationId xmlns:a16="http://schemas.microsoft.com/office/drawing/2014/main" id="{B9771506-43D4-09F0-52A8-A4391A222B85}"/>
+              </a:ext>
+            </a:extLst>
+          </p:cNvPr>
+          <p:cNvSpPr>
+            <a:spLocks noGrp="1"/>
+          </p:cNvSpPr>
+          <p:nvPr>
+            <p:ph idx="1"/>
+          </p:nvPr>
+        </p:nvSpPr>
+        <p:spPr/>
+        <p:txBody>
+          <a:bodyPr/>
+          <a:lstStyle/>
+          <a:p>
+            <a:endParaRPr lang="en-US"/>
+          </a:p>
+        </p:txBody>
+      </p:sp>
+    </p:spTree>
+    <p:extLst>
+      <p:ext uri="{BB962C8B-B14F-4D97-AF65-F5344CB8AC3E}">
+        <p14:creationId xmlns:p14="http://schemas.microsoft.com/office/powerpoint/2010/main" val="1912638304"/>
+      </p:ext>
+    </p:extLst>
+  </p:cSld>
+  <p:clrMapOvr>
+    <a:masterClrMapping/>
+  </p:clrMapOvr>
+</p:sld>
+</file>
+
+<file path=ppt/slides/slide14.xml><?xml version="1.0" encoding="utf-8"?>
+<p:sld xmlns:a="http://schemas.openxmlformats.org/drawingml/2006/main" xmlns:r="http://schemas.openxmlformats.org/officeDocument/2006/relationships" xmlns:p="http://schemas.openxmlformats.org/presentationml/2006/main">
+  <p:cSld>
+    <p:spTree>
+      <p:nvGrpSpPr>
+        <p:cNvPr id="1" name=""/>
+        <p:cNvGrpSpPr/>
+        <p:nvPr/>
+      </p:nvGrpSpPr>
+      <p:grpSpPr>
+        <a:xfrm>
+          <a:off x="0" y="0"/>
+          <a:ext cx="0" cy="0"/>
+          <a:chOff x="0" y="0"/>
+          <a:chExt cx="0" cy="0"/>
+        </a:xfrm>
+      </p:grpSpPr>
+      <p:sp>
+        <p:nvSpPr>
+          <p:cNvPr id="2" name="Title 1">
+            <a:extLst>
+              <a:ext uri="{FF2B5EF4-FFF2-40B4-BE49-F238E27FC236}">
                 <a16:creationId xmlns:a16="http://schemas.microsoft.com/office/drawing/2014/main" id="{70B6DF61-C883-A92C-33C3-C3D8AED9F08B}"/>
               </a:ext>
             </a:extLst>
@@ -5512,7 +5932,7 @@
 </p:sld>
 </file>
 
-<file path=ppt/slides/slide11.xml><?xml version="1.0" encoding="utf-8"?>
+<file path=ppt/slides/slide15.xml><?xml version="1.0" encoding="utf-8"?>
 <p:sld xmlns:a="http://schemas.openxmlformats.org/drawingml/2006/main" xmlns:r="http://schemas.openxmlformats.org/officeDocument/2006/relationships" xmlns:p="http://schemas.openxmlformats.org/presentationml/2006/main">
   <p:cSld>
     <p:spTree>
@@ -5592,7 +6012,7 @@
 </p:sld>
 </file>
 
-<file path=ppt/slides/slide12.xml><?xml version="1.0" encoding="utf-8"?>
+<file path=ppt/slides/slide16.xml><?xml version="1.0" encoding="utf-8"?>
 <p:sld xmlns:a="http://schemas.openxmlformats.org/drawingml/2006/main" xmlns:r="http://schemas.openxmlformats.org/officeDocument/2006/relationships" xmlns:p="http://schemas.openxmlformats.org/presentationml/2006/main">
   <p:cSld>
     <p:spTree>
@@ -5679,7 +6099,7 @@
 </p:sld>
 </file>
 
-<file path=ppt/slides/slide13.xml><?xml version="1.0" encoding="utf-8"?>
+<file path=ppt/slides/slide17.xml><?xml version="1.0" encoding="utf-8"?>
 <p:sld xmlns:a="http://schemas.openxmlformats.org/drawingml/2006/main" xmlns:r="http://schemas.openxmlformats.org/officeDocument/2006/relationships" xmlns:p="http://schemas.openxmlformats.org/presentationml/2006/main">
   <p:cSld>
     <p:spTree>
@@ -6265,13 +6685,52 @@
             </a:r>
             <a:r>
               <a:rPr lang="en-US" dirty="0"/>
-              <a:t>Python prevents other classes from accessing </a:t>
-            </a:r>
-            <a:r>
-              <a:rPr lang="en-US"/>
-              <a:t>that attribute.</a:t>
-            </a:r>
-            <a:endParaRPr lang="en-US" dirty="0"/>
+              <a:t>Python prevents other classes from accessing that attribute.</a:t>
+            </a:r>
+          </a:p>
+          <a:p>
+            <a:r>
+              <a:rPr lang="en-US" dirty="0"/>
+              <a:t>Method calls:</a:t>
+            </a:r>
+          </a:p>
+          <a:p>
+            <a:pPr lvl="1"/>
+            <a:r>
+              <a:rPr lang="en-US" dirty="0"/>
+              <a:t> </a:t>
+            </a:r>
+            <a:r>
+              <a:rPr lang="en-US" dirty="0" err="1"/>
+              <a:t>object.method</a:t>
+            </a:r>
+            <a:r>
+              <a:rPr lang="en-US" dirty="0"/>
+              <a:t>(arguments) is the same as </a:t>
+            </a:r>
+            <a:r>
+              <a:rPr lang="en-US" dirty="0" err="1"/>
+              <a:t>Class.method</a:t>
+            </a:r>
+            <a:r>
+              <a:rPr lang="en-US" dirty="0"/>
+              <a:t>(object, arguments)</a:t>
+            </a:r>
+          </a:p>
+          <a:p>
+            <a:pPr lvl="1"/>
+            <a:r>
+              <a:rPr lang="en-US" dirty="0"/>
+              <a:t>cs88.deposit(5o) vs </a:t>
+            </a:r>
+            <a:r>
+              <a:rPr lang="en-US" dirty="0" err="1"/>
+              <a:t>Account.deposit</a:t>
+            </a:r>
+            <a:r>
+              <a:rPr lang="en-US" dirty="0"/>
+              <a:t>(cs88, 50)</a:t>
+            </a:r>
           </a:p>
         </p:txBody>
       </p:sp>
@@ -6310,7 +6769,7 @@
           <p:cNvPr id="2" name="Title 1">
             <a:extLst>
               <a:ext uri="{FF2B5EF4-FFF2-40B4-BE49-F238E27FC236}">
-                <a16:creationId xmlns:a16="http://schemas.microsoft.com/office/drawing/2014/main" id="{E82EB9BD-23F7-3546-09B0-646A6768A93A}"/>
+                <a16:creationId xmlns:a16="http://schemas.microsoft.com/office/drawing/2014/main" id="{F4F4E24E-8A1F-D257-DF07-792E65EBA343}"/>
               </a:ext>
             </a:extLst>
           </p:cNvPr>
@@ -6328,44 +6787,90 @@
           <a:p>
             <a:r>
               <a:rPr lang="en-US" dirty="0"/>
-              <a:t>SP20 #6</a:t>
+              <a:t>ADTs</a:t>
             </a:r>
           </a:p>
         </p:txBody>
       </p:sp>
-      <p:pic>
-        <p:nvPicPr>
-          <p:cNvPr id="10" name="Content Placeholder 9" descr="Text, letter&#10;&#10;Description automatically generated">
+      <p:sp>
+        <p:nvSpPr>
+          <p:cNvPr id="3" name="Content Placeholder 2">
             <a:extLst>
               <a:ext uri="{FF2B5EF4-FFF2-40B4-BE49-F238E27FC236}">
-                <a16:creationId xmlns:a16="http://schemas.microsoft.com/office/drawing/2014/main" id="{CDDA6128-6E8D-C966-2B62-9EC1AAD38870}"/>
+                <a16:creationId xmlns:a16="http://schemas.microsoft.com/office/drawing/2014/main" id="{94ADD540-D6A1-5EBA-F61B-7D72802B4097}"/>
               </a:ext>
             </a:extLst>
           </p:cNvPr>
-          <p:cNvPicPr>
-            <a:picLocks noGrp="1" noChangeAspect="1"/>
-          </p:cNvPicPr>
+          <p:cNvSpPr>
+            <a:spLocks noGrp="1"/>
+          </p:cNvSpPr>
           <p:nvPr>
             <p:ph idx="1"/>
           </p:nvPr>
-        </p:nvPicPr>
-        <p:blipFill>
-          <a:blip r:embed="rId2"/>
-          <a:stretch>
-            <a:fillRect/>
-          </a:stretch>
-        </p:blipFill>
-        <p:spPr>
-          <a:xfrm>
-            <a:off x="3414809" y="87292"/>
-            <a:ext cx="8483591" cy="6683415"/>
-          </a:xfrm>
-        </p:spPr>
-      </p:pic>
+        </p:nvSpPr>
+        <p:spPr/>
+        <p:txBody>
+          <a:bodyPr/>
+          <a:lstStyle/>
+          <a:p>
+            <a:r>
+              <a:rPr lang="en-US" dirty="0"/>
+              <a:t>Constructors / Selectors / Operators</a:t>
+            </a:r>
+          </a:p>
+          <a:p>
+            <a:pPr lvl="1"/>
+            <a:r>
+              <a:rPr lang="en-US" dirty="0"/>
+              <a:t> help us think about the actions to represent an object.</a:t>
+            </a:r>
+          </a:p>
+          <a:p>
+            <a:r>
+              <a:rPr lang="en-US" dirty="0"/>
+              <a:t>Abstraction Barrier:</a:t>
+            </a:r>
+          </a:p>
+          <a:p>
+            <a:pPr lvl="1"/>
+            <a:r>
+              <a:rPr lang="en-US" dirty="0"/>
+              <a:t> Means that a function does not rely </a:t>
+            </a:r>
+            <a:r>
+              <a:rPr lang="en-US" i="1" dirty="0"/>
+              <a:t>directly</a:t>
+            </a:r>
+            <a:r>
+              <a:rPr lang="en-US" dirty="0"/>
+              <a:t> on a particular implementation</a:t>
+            </a:r>
+          </a:p>
+          <a:p>
+            <a:r>
+              <a:rPr lang="en-US" dirty="0"/>
+              <a:t>Should a function return data?</a:t>
+            </a:r>
+          </a:p>
+          <a:p>
+            <a:pPr lvl="1"/>
+            <a:r>
+              <a:rPr lang="en-US" dirty="0"/>
+              <a:t> Usually yes! It depends on the goals!</a:t>
+            </a:r>
+          </a:p>
+          <a:p>
+            <a:pPr marL="0" indent="0">
+              <a:buNone/>
+            </a:pPr>
+            <a:endParaRPr lang="en-US" dirty="0"/>
+          </a:p>
+        </p:txBody>
+      </p:sp>
     </p:spTree>
     <p:extLst>
       <p:ext uri="{BB962C8B-B14F-4D97-AF65-F5344CB8AC3E}">
-        <p14:creationId xmlns:p14="http://schemas.microsoft.com/office/powerpoint/2010/main" val="1600643390"/>
+        <p14:creationId xmlns:p14="http://schemas.microsoft.com/office/powerpoint/2010/main" val="442178208"/>
       </p:ext>
     </p:extLst>
   </p:cSld>
@@ -6397,7 +6902,7 @@
           <p:cNvPr id="2" name="Title 1">
             <a:extLst>
               <a:ext uri="{FF2B5EF4-FFF2-40B4-BE49-F238E27FC236}">
-                <a16:creationId xmlns:a16="http://schemas.microsoft.com/office/drawing/2014/main" id="{7241903F-7AFF-74C0-F4A3-680355801035}"/>
+                <a16:creationId xmlns:a16="http://schemas.microsoft.com/office/drawing/2014/main" id="{A6538FDC-C77E-CD14-5BCC-002684859DE3}"/>
               </a:ext>
             </a:extLst>
           </p:cNvPr>
@@ -6413,7 +6918,10 @@
           <a:bodyPr/>
           <a:lstStyle/>
           <a:p>
-            <a:endParaRPr lang="en-US"/>
+            <a:r>
+              <a:rPr lang="en-US" dirty="0"/>
+              <a:t>Exam Practice</a:t>
+            </a:r>
           </a:p>
         </p:txBody>
       </p:sp>
@@ -6422,7 +6930,7 @@
           <p:cNvPr id="3" name="Content Placeholder 2">
             <a:extLst>
               <a:ext uri="{FF2B5EF4-FFF2-40B4-BE49-F238E27FC236}">
-                <a16:creationId xmlns:a16="http://schemas.microsoft.com/office/drawing/2014/main" id="{BC6410A9-9F8E-EF96-1BAF-CE99175AEA90}"/>
+                <a16:creationId xmlns:a16="http://schemas.microsoft.com/office/drawing/2014/main" id="{CFAFA79D-8DEB-5749-FBCE-F01C3E741823}"/>
               </a:ext>
             </a:extLst>
           </p:cNvPr>
@@ -6438,44 +6946,23 @@
           <a:bodyPr/>
           <a:lstStyle/>
           <a:p>
-            <a:endParaRPr lang="en-US"/>
+            <a:r>
+              <a:rPr lang="en-US" dirty="0"/>
+              <a:t>Spring 22 Q7</a:t>
+            </a:r>
+          </a:p>
+          <a:p>
+            <a:r>
+              <a:rPr lang="en-US" dirty="0"/>
+              <a:t>Spring 20 Q5</a:t>
+            </a:r>
           </a:p>
         </p:txBody>
       </p:sp>
-      <p:pic>
-        <p:nvPicPr>
-          <p:cNvPr id="4" name="Picture 3" descr="Text, letter&#10;&#10;Description automatically generated">
-            <a:extLst>
-              <a:ext uri="{FF2B5EF4-FFF2-40B4-BE49-F238E27FC236}">
-                <a16:creationId xmlns:a16="http://schemas.microsoft.com/office/drawing/2014/main" id="{6434438D-A105-87C6-29E4-B33765752D82}"/>
-              </a:ext>
-            </a:extLst>
-          </p:cNvPr>
-          <p:cNvPicPr>
-            <a:picLocks noChangeAspect="1"/>
-          </p:cNvPicPr>
-          <p:nvPr/>
-        </p:nvPicPr>
-        <p:blipFill>
-          <a:blip r:embed="rId2"/>
-          <a:stretch>
-            <a:fillRect/>
-          </a:stretch>
-        </p:blipFill>
-        <p:spPr>
-          <a:xfrm>
-            <a:off x="0" y="1141900"/>
-            <a:ext cx="12192000" cy="4574199"/>
-          </a:xfrm>
-          <a:prstGeom prst="rect">
-            <a:avLst/>
-          </a:prstGeom>
-        </p:spPr>
-      </p:pic>
     </p:spTree>
     <p:extLst>
       <p:ext uri="{BB962C8B-B14F-4D97-AF65-F5344CB8AC3E}">
-        <p14:creationId xmlns:p14="http://schemas.microsoft.com/office/powerpoint/2010/main" val="1531018008"/>
+        <p14:creationId xmlns:p14="http://schemas.microsoft.com/office/powerpoint/2010/main" val="497874681"/>
       </p:ext>
     </p:extLst>
   </p:cSld>
@@ -6507,7 +6994,7 @@
           <p:cNvPr id="2" name="Title 1">
             <a:extLst>
               <a:ext uri="{FF2B5EF4-FFF2-40B4-BE49-F238E27FC236}">
-                <a16:creationId xmlns:a16="http://schemas.microsoft.com/office/drawing/2014/main" id="{0063C65A-3343-67FC-B03E-36AF156FA4F7}"/>
+                <a16:creationId xmlns:a16="http://schemas.microsoft.com/office/drawing/2014/main" id="{A1E3D6F5-BF94-EFD7-6263-9CB0A4D701F9}"/>
               </a:ext>
             </a:extLst>
           </p:cNvPr>
@@ -6525,49 +7012,26 @@
           <a:p>
             <a:r>
               <a:rPr lang="en-US" dirty="0"/>
-              <a:t>Fall 2019  #6</a:t>
-            </a:r>
-          </a:p>
-        </p:txBody>
-      </p:sp>
-      <p:sp>
-        <p:nvSpPr>
-          <p:cNvPr id="3" name="Content Placeholder 2">
-            <a:extLst>
-              <a:ext uri="{FF2B5EF4-FFF2-40B4-BE49-F238E27FC236}">
-                <a16:creationId xmlns:a16="http://schemas.microsoft.com/office/drawing/2014/main" id="{248C76F7-115E-A2DF-5F65-803EC7C27100}"/>
-              </a:ext>
-            </a:extLst>
-          </p:cNvPr>
-          <p:cNvSpPr>
-            <a:spLocks noGrp="1"/>
-          </p:cNvSpPr>
-          <p:nvPr>
-            <p:ph idx="1"/>
-          </p:nvPr>
-        </p:nvSpPr>
-        <p:spPr/>
-        <p:txBody>
-          <a:bodyPr/>
-          <a:lstStyle/>
-          <a:p>
-            <a:endParaRPr lang="en-US"/>
+              <a:t>SP22</a:t>
+            </a:r>
           </a:p>
         </p:txBody>
       </p:sp>
       <p:pic>
         <p:nvPicPr>
-          <p:cNvPr id="4" name="Content Placeholder 4" descr="Text, letter&#10;&#10;Description automatically generated">
+          <p:cNvPr id="9" name="Content Placeholder 8" descr="Text, letter&#10;&#10;Description automatically generated">
             <a:extLst>
               <a:ext uri="{FF2B5EF4-FFF2-40B4-BE49-F238E27FC236}">
-                <a16:creationId xmlns:a16="http://schemas.microsoft.com/office/drawing/2014/main" id="{3CF6B68D-5EF3-F4F5-445F-759A32926B97}"/>
+                <a16:creationId xmlns:a16="http://schemas.microsoft.com/office/drawing/2014/main" id="{FC1FC4FE-E7B1-87ED-7155-8745AD2A71AF}"/>
               </a:ext>
             </a:extLst>
           </p:cNvPr>
           <p:cNvPicPr>
-            <a:picLocks noChangeAspect="1"/>
+            <a:picLocks noGrp="1" noChangeAspect="1"/>
           </p:cNvPicPr>
-          <p:nvPr/>
+          <p:nvPr>
+            <p:ph idx="1"/>
+          </p:nvPr>
         </p:nvPicPr>
         <p:blipFill>
           <a:blip r:embed="rId2"/>
@@ -6575,46 +7039,17 @@
             <a:fillRect/>
           </a:stretch>
         </p:blipFill>
-        <p:spPr bwMode="auto">
+        <p:spPr>
           <a:xfrm>
-            <a:off x="736655" y="1066800"/>
-            <a:ext cx="10718690" cy="5257800"/>
+            <a:off x="2280214" y="103961"/>
+            <a:ext cx="9911786" cy="6787103"/>
           </a:xfrm>
-          <a:prstGeom prst="rect">
-            <a:avLst/>
-          </a:prstGeom>
-          <a:noFill/>
-          <a:ln>
-            <a:noFill/>
-          </a:ln>
-          <a:extLst>
-            <a:ext uri="{909E8E84-426E-40dd-AFC4-6F175D3DCCD1}">
-              <a14:hiddenFill xmlns:a14="http://schemas.microsoft.com/office/drawing/2010/main" xmlns="">
-                <a:solidFill>
-                  <a:srgbClr val="FFFFFF"/>
-                </a:solidFill>
-              </a14:hiddenFill>
-            </a:ext>
-            <a:ext uri="{91240B29-F687-4f45-9708-019B960494DF}">
-              <a14:hiddenLine xmlns:a14="http://schemas.microsoft.com/office/drawing/2010/main" xmlns="" w="9525">
-                <a:solidFill>
-                  <a:srgbClr val="000000"/>
-                </a:solidFill>
-                <a:miter lim="800000"/>
-                <a:headEnd/>
-                <a:tailEnd/>
-              </a14:hiddenLine>
-            </a:ext>
-            <a:ext uri="{FAA26D3D-D897-4be2-8F04-BA451C77F1D7}">
-              <ma14:placeholderFlag xmlns:ma14="http://schemas.microsoft.com/office/mac/drawingml/2011/main" xmlns="" val="1"/>
-            </a:ext>
-          </a:extLst>
         </p:spPr>
       </p:pic>
     </p:spTree>
     <p:extLst>
       <p:ext uri="{BB962C8B-B14F-4D97-AF65-F5344CB8AC3E}">
-        <p14:creationId xmlns:p14="http://schemas.microsoft.com/office/powerpoint/2010/main" val="3432139222"/>
+        <p14:creationId xmlns:p14="http://schemas.microsoft.com/office/powerpoint/2010/main" val="839918288"/>
       </p:ext>
     </p:extLst>
   </p:cSld>
@@ -6646,7 +7081,7 @@
           <p:cNvPr id="2" name="Title 1">
             <a:extLst>
               <a:ext uri="{FF2B5EF4-FFF2-40B4-BE49-F238E27FC236}">
-                <a16:creationId xmlns:a16="http://schemas.microsoft.com/office/drawing/2014/main" id="{7088AF82-6302-1F34-6280-ED0F172821AA}"/>
+                <a16:creationId xmlns:a16="http://schemas.microsoft.com/office/drawing/2014/main" id="{9E329A1B-89B3-5AC6-68B4-2DD245465319}"/>
               </a:ext>
             </a:extLst>
           </p:cNvPr>
@@ -6666,35 +7101,39 @@
           </a:p>
         </p:txBody>
       </p:sp>
-      <p:sp>
-        <p:nvSpPr>
-          <p:cNvPr id="3" name="Content Placeholder 2">
+      <p:pic>
+        <p:nvPicPr>
+          <p:cNvPr id="5" name="Content Placeholder 4" descr="Text, letter&#10;&#10;Description automatically generated">
             <a:extLst>
               <a:ext uri="{FF2B5EF4-FFF2-40B4-BE49-F238E27FC236}">
-                <a16:creationId xmlns:a16="http://schemas.microsoft.com/office/drawing/2014/main" id="{B9771506-43D4-09F0-52A8-A4391A222B85}"/>
+                <a16:creationId xmlns:a16="http://schemas.microsoft.com/office/drawing/2014/main" id="{58757153-F7E5-3D2F-8F9B-4C14FD159E4E}"/>
               </a:ext>
             </a:extLst>
           </p:cNvPr>
-          <p:cNvSpPr>
-            <a:spLocks noGrp="1"/>
-          </p:cNvSpPr>
+          <p:cNvPicPr>
+            <a:picLocks noGrp="1" noChangeAspect="1"/>
+          </p:cNvPicPr>
           <p:nvPr>
             <p:ph idx="1"/>
           </p:nvPr>
-        </p:nvSpPr>
-        <p:spPr/>
-        <p:txBody>
-          <a:bodyPr/>
-          <a:lstStyle/>
-          <a:p>
-            <a:endParaRPr lang="en-US"/>
-          </a:p>
-        </p:txBody>
-      </p:sp>
+        </p:nvPicPr>
+        <p:blipFill>
+          <a:blip r:embed="rId2"/>
+          <a:stretch>
+            <a:fillRect/>
+          </a:stretch>
+        </p:blipFill>
+        <p:spPr>
+          <a:xfrm>
+            <a:off x="2271623" y="0"/>
+            <a:ext cx="9920377" cy="6858000"/>
+          </a:xfrm>
+        </p:spPr>
+      </p:pic>
     </p:spTree>
     <p:extLst>
       <p:ext uri="{BB962C8B-B14F-4D97-AF65-F5344CB8AC3E}">
-        <p14:creationId xmlns:p14="http://schemas.microsoft.com/office/powerpoint/2010/main" val="1912638304"/>
+        <p14:creationId xmlns:p14="http://schemas.microsoft.com/office/powerpoint/2010/main" val="3337011242"/>
       </p:ext>
     </p:extLst>
   </p:cSld>

</xml_diff>